<commit_message>
Jum'at 07 November 2025 21.31
</commit_message>
<xml_diff>
--- a/ORG/Triwulan_1_Kaderisasi Fiks.pptx
+++ b/ORG/Triwulan_1_Kaderisasi Fiks.pptx
@@ -35591,16 +35591,28 @@
               <a:t> </a:t>
             </a:r>
             <a:r>
-              <a:rPr lang="en-US" sz="2157" b="0" i="0" u="none" strike="noStrike" cap="none">
-                <a:solidFill>
-                  <a:srgbClr val="29455B"/>
-                </a:solidFill>
-                <a:latin typeface="Open Sans"/>
-                <a:ea typeface="Open Sans"/>
-                <a:cs typeface="Open Sans"/>
-                <a:sym typeface="Open Sans"/>
-              </a:rPr>
-              <a:t>terduga.</a:t>
+              <a:rPr lang="en-US" sz="2157" b="0" i="0" u="none" strike="noStrike" cap="none" dirty="0" err="1">
+                <a:solidFill>
+                  <a:srgbClr val="29455B"/>
+                </a:solidFill>
+                <a:latin typeface="Open Sans"/>
+                <a:ea typeface="Open Sans"/>
+                <a:cs typeface="Open Sans"/>
+                <a:sym typeface="Open Sans"/>
+              </a:rPr>
+              <a:t>terduga</a:t>
+            </a:r>
+            <a:r>
+              <a:rPr lang="en-US" sz="2157" b="0" i="0" u="none" strike="noStrike" cap="none" dirty="0">
+                <a:solidFill>
+                  <a:srgbClr val="29455B"/>
+                </a:solidFill>
+                <a:latin typeface="Open Sans"/>
+                <a:ea typeface="Open Sans"/>
+                <a:cs typeface="Open Sans"/>
+                <a:sym typeface="Open Sans"/>
+              </a:rPr>
+              <a:t>.</a:t>
             </a:r>
             <a:endParaRPr dirty="0"/>
           </a:p>

</xml_diff>